<commit_message>
Added addition technologies used to presentation.
</commit_message>
<xml_diff>
--- a/documentation/Space Debris Detection.pptx
+++ b/documentation/Space Debris Detection.pptx
@@ -142,7 +142,7 @@
 <file path=ppt/revisionInfo.xml><?xml version="1.0" encoding="utf-8"?>
 <p1510:revInfo xmlns:a="http://schemas.openxmlformats.org/drawingml/2006/main" xmlns:r="http://schemas.openxmlformats.org/officeDocument/2006/relationships" xmlns:p1510="http://schemas.microsoft.com/office/powerpoint/2015/10/main">
   <p1510:revLst>
-    <p1510:client id="{58452C96-3AD7-40CA-A419-256E75AB16ED}" v="16" dt="2025-05-30T17:56:13.351"/>
+    <p1510:client id="{58452C96-3AD7-40CA-A419-256E75AB16ED}" v="17" dt="2025-05-30T18:16:31.997"/>
   </p1510:revLst>
 </p1510:revInfo>
 </file>
@@ -152,7 +152,7 @@
   <pc:docChgLst>
     <pc:chgData name="Othell Hamilton" userId="a081f09f342d0cec" providerId="LiveId" clId="{58452C96-3AD7-40CA-A419-256E75AB16ED}"/>
     <pc:docChg chg="undo custSel addSld delSld modSld sldOrd">
-      <pc:chgData name="Othell Hamilton" userId="a081f09f342d0cec" providerId="LiveId" clId="{58452C96-3AD7-40CA-A419-256E75AB16ED}" dt="2025-05-30T17:56:13.351" v="550"/>
+      <pc:chgData name="Othell Hamilton" userId="a081f09f342d0cec" providerId="LiveId" clId="{58452C96-3AD7-40CA-A419-256E75AB16ED}" dt="2025-05-30T18:19:59.480" v="704" actId="20577"/>
       <pc:docMkLst>
         <pc:docMk/>
       </pc:docMkLst>
@@ -367,8 +367,8 @@
           <pc:sldMk cId="3353460760" sldId="287"/>
         </pc:sldMkLst>
       </pc:sldChg>
-      <pc:sldChg chg="modSp add del">
-        <pc:chgData name="Othell Hamilton" userId="a081f09f342d0cec" providerId="LiveId" clId="{58452C96-3AD7-40CA-A419-256E75AB16ED}" dt="2025-05-30T17:55:45.333" v="548"/>
+      <pc:sldChg chg="modSp add del mod">
+        <pc:chgData name="Othell Hamilton" userId="a081f09f342d0cec" providerId="LiveId" clId="{58452C96-3AD7-40CA-A419-256E75AB16ED}" dt="2025-05-30T18:19:59.480" v="704" actId="20577"/>
         <pc:sldMkLst>
           <pc:docMk/>
           <pc:sldMk cId="414523832" sldId="288"/>
@@ -379,6 +379,14 @@
             <pc:docMk/>
             <pc:sldMk cId="414523832" sldId="288"/>
             <ac:spMk id="2" creationId="{338A15DE-D135-0710-9984-A0A55E960CB0}"/>
+          </ac:spMkLst>
+        </pc:spChg>
+        <pc:spChg chg="mod">
+          <ac:chgData name="Othell Hamilton" userId="a081f09f342d0cec" providerId="LiveId" clId="{58452C96-3AD7-40CA-A419-256E75AB16ED}" dt="2025-05-30T18:19:59.480" v="704" actId="20577"/>
+          <ac:spMkLst>
+            <pc:docMk/>
+            <pc:sldMk cId="414523832" sldId="288"/>
+            <ac:spMk id="3" creationId="{ECC8AA23-D8D0-93BE-5C5F-103A750B0D2F}"/>
           </ac:spMkLst>
         </pc:spChg>
       </pc:sldChg>
@@ -21398,6 +21406,10 @@
           </p:nvPr>
         </p:nvSpPr>
         <p:spPr>
+          <a:xfrm>
+            <a:off x="583161" y="2827209"/>
+            <a:ext cx="7376051" cy="3442144"/>
+          </a:xfrm>
           <a:noFill/>
         </p:spPr>
         <p:txBody>
@@ -21406,16 +21418,29 @@
           </a:bodyPr>
           <a:lstStyle/>
           <a:p>
+            <a:pPr marL="285750" indent="-285750" algn="l" fontAlgn="base">
+              <a:buFont typeface="Arial" panose="020B0604020202020204" pitchFamily="34" charset="0"/>
+              <a:buChar char="•"/>
+            </a:pPr>
             <a:r>
               <a:rPr lang="en-US" dirty="0"/>
-              <a:t>Your ability to communicate effectively will leave a lasting impact on your audience</a:t>
+              <a:t>Google Earth Engine API to download satellite images.</a:t>
             </a:r>
           </a:p>
           <a:p>
+            <a:pPr marL="285750" indent="-285750" algn="l" fontAlgn="base">
+              <a:buFont typeface="Arial" panose="020B0604020202020204" pitchFamily="34" charset="0"/>
+              <a:buChar char="•"/>
+            </a:pPr>
             <a:r>
               <a:rPr lang="en-US" dirty="0"/>
-              <a:t>Effectively communicating involves not only delivering a message but also resonating with the experiences, values, and emotions of those listening</a:t>
+              <a:t>Python for neural </a:t>
             </a:r>
+            <a:r>
+              <a:rPr lang="en-US"/>
+              <a:t>network processing</a:t>
+            </a:r>
+            <a:endParaRPr lang="en-US" dirty="0"/>
           </a:p>
         </p:txBody>
       </p:sp>
@@ -22612,12 +22637,23 @@
 </file>
 
 <file path=customXml/item1.xml><?xml version="1.0" encoding="utf-8"?>
-<?mso-contentType ?>
-<FormTemplates xmlns="http://schemas.microsoft.com/sharepoint/v3/contenttype/forms">
-  <Display>DocumentLibraryForm</Display>
-  <Edit>DocumentLibraryForm</Edit>
-  <New>DocumentLibraryForm</New>
-</FormTemplates>
+<p:properties xmlns:p="http://schemas.microsoft.com/office/2006/metadata/properties" xmlns:xsi="http://www.w3.org/2001/XMLSchema-instance" xmlns:pc="http://schemas.microsoft.com/office/infopath/2007/PartnerControls">
+  <documentManagement>
+    <_ip_UnifiedCompliancePolicyUIAction xmlns="http://schemas.microsoft.com/sharepoint/v3" xsi:nil="true"/>
+    <Image xmlns="71af3243-3dd4-4a8d-8c0d-dd76da1f02a5">
+      <Url xsi:nil="true"/>
+      <Description xsi:nil="true"/>
+    </Image>
+    <Status xmlns="71af3243-3dd4-4a8d-8c0d-dd76da1f02a5">Not started</Status>
+    <Background xmlns="71af3243-3dd4-4a8d-8c0d-dd76da1f02a5">false</Background>
+    <_ip_UnifiedCompliancePolicyProperties xmlns="http://schemas.microsoft.com/sharepoint/v3" xsi:nil="true"/>
+    <ImageTagsTaxHTField xmlns="71af3243-3dd4-4a8d-8c0d-dd76da1f02a5">
+      <Terms xmlns="http://schemas.microsoft.com/office/infopath/2007/PartnerControls"/>
+    </ImageTagsTaxHTField>
+    <TaxCatchAll xmlns="230e9df3-be65-4c73-a93b-d1236ebd677e" xsi:nil="true"/>
+    <MediaServiceKeyPoints xmlns="71af3243-3dd4-4a8d-8c0d-dd76da1f02a5" xsi:nil="true"/>
+  </documentManagement>
+</p:properties>
 </file>
 
 <file path=customXml/item2.xml><?xml version="1.0" encoding="utf-8"?>
@@ -22933,29 +22969,29 @@
 </file>
 
 <file path=customXml/item3.xml><?xml version="1.0" encoding="utf-8"?>
-<p:properties xmlns:p="http://schemas.microsoft.com/office/2006/metadata/properties" xmlns:xsi="http://www.w3.org/2001/XMLSchema-instance" xmlns:pc="http://schemas.microsoft.com/office/infopath/2007/PartnerControls">
-  <documentManagement>
-    <_ip_UnifiedCompliancePolicyUIAction xmlns="http://schemas.microsoft.com/sharepoint/v3" xsi:nil="true"/>
-    <Image xmlns="71af3243-3dd4-4a8d-8c0d-dd76da1f02a5">
-      <Url xsi:nil="true"/>
-      <Description xsi:nil="true"/>
-    </Image>
-    <Status xmlns="71af3243-3dd4-4a8d-8c0d-dd76da1f02a5">Not started</Status>
-    <Background xmlns="71af3243-3dd4-4a8d-8c0d-dd76da1f02a5">false</Background>
-    <_ip_UnifiedCompliancePolicyProperties xmlns="http://schemas.microsoft.com/sharepoint/v3" xsi:nil="true"/>
-    <ImageTagsTaxHTField xmlns="71af3243-3dd4-4a8d-8c0d-dd76da1f02a5">
-      <Terms xmlns="http://schemas.microsoft.com/office/infopath/2007/PartnerControls"/>
-    </ImageTagsTaxHTField>
-    <TaxCatchAll xmlns="230e9df3-be65-4c73-a93b-d1236ebd677e" xsi:nil="true"/>
-    <MediaServiceKeyPoints xmlns="71af3243-3dd4-4a8d-8c0d-dd76da1f02a5" xsi:nil="true"/>
-  </documentManagement>
-</p:properties>
+<?mso-contentType ?>
+<FormTemplates xmlns="http://schemas.microsoft.com/sharepoint/v3/contenttype/forms">
+  <Display>DocumentLibraryForm</Display>
+  <Edit>DocumentLibraryForm</Edit>
+  <New>DocumentLibraryForm</New>
+</FormTemplates>
 </file>
 
 <file path=customXml/itemProps1.xml><?xml version="1.0" encoding="utf-8"?>
-<ds:datastoreItem xmlns:ds="http://schemas.openxmlformats.org/officeDocument/2006/customXml" ds:itemID="{2F49CD38-5B57-4682-9FCE-B9174068D0AE}">
+<ds:datastoreItem xmlns:ds="http://schemas.openxmlformats.org/officeDocument/2006/customXml" ds:itemID="{1F342EE1-43E5-4AFB-895D-B61B9656DC14}">
   <ds:schemaRefs>
-    <ds:schemaRef ds:uri="http://schemas.microsoft.com/sharepoint/v3/contenttype/forms"/>
+    <ds:schemaRef ds:uri="http://schemas.microsoft.com/office/2006/documentManagement/types"/>
+    <ds:schemaRef ds:uri="http://schemas.microsoft.com/sharepoint/v3"/>
+    <ds:schemaRef ds:uri="http://purl.org/dc/dcmitype/"/>
+    <ds:schemaRef ds:uri="http://purl.org/dc/elements/1.1/"/>
+    <ds:schemaRef ds:uri="http://purl.org/dc/terms/"/>
+    <ds:schemaRef ds:uri="http://schemas.microsoft.com/office/infopath/2007/PartnerControls"/>
+    <ds:schemaRef ds:uri="http://schemas.microsoft.com/office/2006/metadata/properties"/>
+    <ds:schemaRef ds:uri="http://www.w3.org/XML/1998/namespace"/>
+    <ds:schemaRef ds:uri="http://schemas.openxmlformats.org/package/2006/metadata/core-properties"/>
+    <ds:schemaRef ds:uri="230e9df3-be65-4c73-a93b-d1236ebd677e"/>
+    <ds:schemaRef ds:uri="16c05727-aa75-4e4a-9b5f-8a80a1165891"/>
+    <ds:schemaRef ds:uri="71af3243-3dd4-4a8d-8c0d-dd76da1f02a5"/>
   </ds:schemaRefs>
 </ds:datastoreItem>
 </file>
@@ -22982,20 +23018,9 @@
 </file>
 
 <file path=customXml/itemProps3.xml><?xml version="1.0" encoding="utf-8"?>
-<ds:datastoreItem xmlns:ds="http://schemas.openxmlformats.org/officeDocument/2006/customXml" ds:itemID="{1F342EE1-43E5-4AFB-895D-B61B9656DC14}">
+<ds:datastoreItem xmlns:ds="http://schemas.openxmlformats.org/officeDocument/2006/customXml" ds:itemID="{2F49CD38-5B57-4682-9FCE-B9174068D0AE}">
   <ds:schemaRefs>
-    <ds:schemaRef ds:uri="http://schemas.microsoft.com/office/2006/documentManagement/types"/>
-    <ds:schemaRef ds:uri="http://schemas.microsoft.com/sharepoint/v3"/>
-    <ds:schemaRef ds:uri="http://purl.org/dc/dcmitype/"/>
-    <ds:schemaRef ds:uri="http://purl.org/dc/elements/1.1/"/>
-    <ds:schemaRef ds:uri="http://purl.org/dc/terms/"/>
-    <ds:schemaRef ds:uri="http://schemas.microsoft.com/office/infopath/2007/PartnerControls"/>
-    <ds:schemaRef ds:uri="http://schemas.microsoft.com/office/2006/metadata/properties"/>
-    <ds:schemaRef ds:uri="http://www.w3.org/XML/1998/namespace"/>
-    <ds:schemaRef ds:uri="http://schemas.openxmlformats.org/package/2006/metadata/core-properties"/>
-    <ds:schemaRef ds:uri="230e9df3-be65-4c73-a93b-d1236ebd677e"/>
-    <ds:schemaRef ds:uri="16c05727-aa75-4e4a-9b5f-8a80a1165891"/>
-    <ds:schemaRef ds:uri="71af3243-3dd4-4a8d-8c0d-dd76da1f02a5"/>
+    <ds:schemaRef ds:uri="http://schemas.microsoft.com/sharepoint/v3/contenttype/forms"/>
   </ds:schemaRefs>
 </ds:datastoreItem>
 </file>

</xml_diff>